<commit_message>
Getting there aututo powerpoint and webpage
</commit_message>
<xml_diff>
--- a/West Sussex C19 weekly datapack template.pptx
+++ b/West Sussex C19 weekly datapack template.pptx
@@ -5,14 +5,13 @@
     <p:sldMasterId id="2147483648" r:id="rId4"/>
   </p:sldMasterIdLst>
   <p:notesMasterIdLst>
-    <p:notesMasterId r:id="rId7"/>
+    <p:notesMasterId r:id="rId6"/>
   </p:notesMasterIdLst>
   <p:handoutMasterIdLst>
-    <p:handoutMasterId r:id="rId8"/>
+    <p:handoutMasterId r:id="rId7"/>
   </p:handoutMasterIdLst>
   <p:sldIdLst>
-    <p:sldId id="256" r:id="rId5"/>
-    <p:sldId id="283" r:id="rId6"/>
+    <p:sldId id="283" r:id="rId5"/>
   </p:sldIdLst>
   <p:sldSz cx="12192000" cy="6858000"/>
   <p:notesSz cx="7099300" cy="10234613"/>
@@ -228,7 +227,7 @@
           <a:p>
             <a:fld id="{4F4BE593-4F5C-4247-8B72-DF5304408724}" type="datetimeFigureOut">
               <a:rPr lang="en-GB" smtClean="0"/>
-              <a:t>22/07/2020</a:t>
+              <a:t>27/07/2020</a:t>
             </a:fld>
             <a:endParaRPr lang="en-GB"/>
           </a:p>
@@ -409,7 +408,7 @@
           <a:p>
             <a:fld id="{69F2F94F-1C29-4372-94B6-79A45F0E2BD2}" type="datetimeFigureOut">
               <a:rPr lang="en-GB" smtClean="0"/>
-              <a:t>22/07/2020</a:t>
+              <a:t>27/07/2020</a:t>
             </a:fld>
             <a:endParaRPr lang="en-GB"/>
           </a:p>
@@ -830,7 +829,7 @@
           <a:p>
             <a:fld id="{26C29144-6561-4B8B-B9F1-36ECB9B30B11}" type="datetime4">
               <a:rPr lang="en-GB" smtClean="0"/>
-              <a:t>22 July 2020</a:t>
+              <a:t>27 July 2020</a:t>
             </a:fld>
             <a:endParaRPr lang="en-GB"/>
           </a:p>
@@ -930,38 +929,53 @@
       </p:grpSpPr>
       <p:sp>
         <p:nvSpPr>
-          <p:cNvPr id="2" name="Title 1">
+          <p:cNvPr id="8" name="Rectangle 7">
             <a:extLst>
               <a:ext uri="{FF2B5EF4-FFF2-40B4-BE49-F238E27FC236}">
-                <a16:creationId xmlns:a16="http://schemas.microsoft.com/office/drawing/2014/main" id="{97F27902-5B27-8D4E-BAAF-86EE1B40D30A}"/>
+                <a16:creationId xmlns:a16="http://schemas.microsoft.com/office/drawing/2014/main" id="{53A52482-26E0-7D43-9232-3A46F6F1DF68}"/>
               </a:ext>
             </a:extLst>
           </p:cNvPr>
-          <p:cNvSpPr>
-            <a:spLocks noGrp="1"/>
-          </p:cNvSpPr>
-          <p:nvPr>
-            <p:ph type="title"/>
-          </p:nvPr>
+          <p:cNvSpPr/>
+          <p:nvPr userDrawn="1"/>
         </p:nvSpPr>
         <p:spPr>
+          <a:xfrm>
+            <a:off x="0" y="0"/>
+            <a:ext cx="12192000" cy="501650"/>
+          </a:xfrm>
+          <a:prstGeom prst="rect">
+            <a:avLst/>
+          </a:prstGeom>
           <a:solidFill>
-            <a:schemeClr val="accent5">
-              <a:lumMod val="40000"/>
-              <a:lumOff val="60000"/>
+            <a:schemeClr val="accent1">
+              <a:lumMod val="20000"/>
+              <a:lumOff val="80000"/>
             </a:schemeClr>
           </a:solidFill>
-          <a:ln w="12700">
-            <a:solidFill>
-              <a:srgbClr val="2F528F"/>
-            </a:solidFill>
-          </a:ln>
         </p:spPr>
+        <p:style>
+          <a:lnRef idx="2">
+            <a:schemeClr val="accent1">
+              <a:shade val="50000"/>
+            </a:schemeClr>
+          </a:lnRef>
+          <a:fillRef idx="1">
+            <a:schemeClr val="accent1"/>
+          </a:fillRef>
+          <a:effectRef idx="0">
+            <a:schemeClr val="accent1"/>
+          </a:effectRef>
+          <a:fontRef idx="minor">
+            <a:schemeClr val="lt1"/>
+          </a:fontRef>
+        </p:style>
         <p:txBody>
-          <a:bodyPr/>
+          <a:bodyPr rtlCol="0" anchor="ctr"/>
           <a:lstStyle/>
           <a:p>
-            <a:endParaRPr lang="en-US" dirty="0"/>
+            <a:pPr algn="ctr"/>
+            <a:endParaRPr lang="en-US"/>
           </a:p>
         </p:txBody>
       </p:sp>
@@ -992,6 +1006,11 @@
               <a:lumOff val="60000"/>
             </a:schemeClr>
           </a:solidFill>
+          <a:ln>
+            <a:solidFill>
+              <a:schemeClr val="accent1"/>
+            </a:solidFill>
+          </a:ln>
         </p:spPr>
         <p:txBody>
           <a:bodyPr/>
@@ -1012,57 +1031,7 @@
             <a:fld id="{689F9312-E64A-4DE9-B065-134A619B7E4E}" type="datetime4">
               <a:rPr lang="en-GB" smtClean="0"/>
               <a:pPr/>
-              <a:t>22 July 2020</a:t>
-            </a:fld>
-            <a:endParaRPr lang="en-GB" dirty="0"/>
-          </a:p>
-        </p:txBody>
-      </p:sp>
-      <p:sp>
-        <p:nvSpPr>
-          <p:cNvPr id="4" name="Slide Number Placeholder 3">
-            <a:extLst>
-              <a:ext uri="{FF2B5EF4-FFF2-40B4-BE49-F238E27FC236}">
-                <a16:creationId xmlns:a16="http://schemas.microsoft.com/office/drawing/2014/main" id="{C54DF046-6C35-5A43-A37C-4D7696478CAD}"/>
-              </a:ext>
-            </a:extLst>
-          </p:cNvPr>
-          <p:cNvSpPr>
-            <a:spLocks noGrp="1"/>
-          </p:cNvSpPr>
-          <p:nvPr>
-            <p:ph type="sldNum" sz="quarter" idx="11"/>
-          </p:nvPr>
-        </p:nvSpPr>
-        <p:spPr>
-          <a:xfrm>
-            <a:off x="10718799" y="6173786"/>
-            <a:ext cx="1208709" cy="365125"/>
-          </a:xfrm>
-          <a:solidFill>
-            <a:schemeClr val="bg2"/>
-          </a:solidFill>
-        </p:spPr>
-        <p:txBody>
-          <a:bodyPr/>
-          <a:lstStyle>
-            <a:lvl1pPr algn="ctr">
-              <a:defRPr sz="1800">
-                <a:solidFill>
-                  <a:schemeClr val="tx1"/>
-                </a:solidFill>
-              </a:defRPr>
-            </a:lvl1pPr>
-          </a:lstStyle>
-          <a:p>
-            <a:r>
-              <a:rPr lang="en-GB" dirty="0"/>
-              <a:t>Slide </a:t>
-            </a:r>
-            <a:fld id="{197E031E-CC7C-4FFD-B59E-418DD80E7695}" type="slidenum">
-              <a:rPr lang="en-GB" smtClean="0"/>
-              <a:pPr/>
-              <a:t>‹#›</a:t>
+              <a:t>27 July 2020</a:t>
             </a:fld>
             <a:endParaRPr lang="en-GB" dirty="0"/>
           </a:p>
@@ -1082,7 +1051,7 @@
         </p:nvSpPr>
         <p:spPr>
           <a:xfrm>
-            <a:off x="23190" y="98599"/>
+            <a:off x="23190" y="79549"/>
             <a:ext cx="4000198" cy="369332"/>
           </a:xfrm>
           <a:prstGeom prst="rect">
@@ -1117,7 +1086,7 @@
         </p:nvSpPr>
         <p:spPr>
           <a:xfrm>
-            <a:off x="9319505" y="98599"/>
+            <a:off x="9319505" y="79549"/>
             <a:ext cx="2841996" cy="369332"/>
           </a:xfrm>
           <a:prstGeom prst="rect">
@@ -1172,7 +1141,7 @@
         </p:blipFill>
         <p:spPr>
           <a:xfrm>
-            <a:off x="362355" y="868180"/>
+            <a:off x="362355" y="791980"/>
             <a:ext cx="1369169" cy="889960"/>
           </a:xfrm>
           <a:prstGeom prst="rect">
@@ -1198,8 +1167,8 @@
         </p:nvSpPr>
         <p:spPr>
           <a:xfrm>
-            <a:off x="260350" y="1944127"/>
-            <a:ext cx="4603750" cy="454025"/>
+            <a:off x="260349" y="1944127"/>
+            <a:ext cx="6611505" cy="454025"/>
           </a:xfrm>
           <a:prstGeom prst="rect">
             <a:avLst/>
@@ -1210,7 +1179,7 @@
           <a:lstStyle>
             <a:lvl1pPr marL="0" indent="0">
               <a:buNone/>
-              <a:defRPr sz="2400">
+              <a:defRPr sz="2400" b="1">
                 <a:solidFill>
                   <a:schemeClr val="accent5">
                     <a:lumMod val="75000"/>
@@ -1254,6 +1223,12 @@
           <a:bodyPr/>
           <a:lstStyle>
             <a:lvl1pPr marL="0" indent="0">
+              <a:lnSpc>
+                <a:spcPct val="100000"/>
+              </a:lnSpc>
+              <a:spcAft>
+                <a:spcPts val="600"/>
+              </a:spcAft>
               <a:buNone/>
               <a:defRPr sz="2000"/>
             </a:lvl1pPr>
@@ -1283,7 +1258,7 @@
         <p:spPr>
           <a:xfrm>
             <a:off x="260350" y="5486400"/>
-            <a:ext cx="1763713" cy="419100"/>
+            <a:ext cx="2759941" cy="419100"/>
           </a:xfrm>
           <a:prstGeom prst="rect">
             <a:avLst/>
@@ -1321,7 +1296,7 @@
         </p:nvSpPr>
         <p:spPr>
           <a:xfrm>
-            <a:off x="260350" y="6019800"/>
+            <a:off x="260349" y="5878800"/>
             <a:ext cx="3409950" cy="336550"/>
           </a:xfrm>
           <a:prstGeom prst="rect">
@@ -1333,8 +1308,64 @@
           <a:lstStyle>
             <a:lvl1pPr marL="0" indent="0">
               <a:buNone/>
-              <a:defRPr sz="2000"/>
+              <a:defRPr sz="1800"/>
             </a:lvl1pPr>
+          </a:lstStyle>
+          <a:p>
+            <a:pPr lvl="0"/>
+            <a:endParaRPr lang="en-US" dirty="0"/>
+          </a:p>
+        </p:txBody>
+      </p:sp>
+      <p:sp>
+        <p:nvSpPr>
+          <p:cNvPr id="15" name="Text Placeholder 12">
+            <a:extLst>
+              <a:ext uri="{FF2B5EF4-FFF2-40B4-BE49-F238E27FC236}">
+                <a16:creationId xmlns:a16="http://schemas.microsoft.com/office/drawing/2014/main" id="{F8F210A9-903A-D541-9E91-B2C677DC7C6D}"/>
+              </a:ext>
+            </a:extLst>
+          </p:cNvPr>
+          <p:cNvSpPr>
+            <a:spLocks noGrp="1"/>
+          </p:cNvSpPr>
+          <p:nvPr>
+            <p:ph type="body" sz="quarter" idx="17"/>
+          </p:nvPr>
+        </p:nvSpPr>
+        <p:spPr>
+          <a:xfrm>
+            <a:off x="10702754" y="6173785"/>
+            <a:ext cx="1236662" cy="365124"/>
+          </a:xfrm>
+          <a:prstGeom prst="rect">
+            <a:avLst/>
+          </a:prstGeom>
+          <a:solidFill>
+            <a:schemeClr val="bg1">
+              <a:lumMod val="85000"/>
+            </a:schemeClr>
+          </a:solidFill>
+        </p:spPr>
+        <p:txBody>
+          <a:bodyPr/>
+          <a:lstStyle>
+            <a:lvl1pPr marL="0" indent="0" algn="ctr">
+              <a:buNone/>
+              <a:defRPr sz="1800"/>
+            </a:lvl1pPr>
+            <a:lvl2pPr>
+              <a:defRPr sz="1100"/>
+            </a:lvl2pPr>
+            <a:lvl3pPr>
+              <a:defRPr sz="1100"/>
+            </a:lvl3pPr>
+            <a:lvl4pPr>
+              <a:defRPr sz="1100"/>
+            </a:lvl4pPr>
+            <a:lvl5pPr>
+              <a:defRPr sz="1100"/>
+            </a:lvl5pPr>
           </a:lstStyle>
           <a:p>
             <a:pPr lvl="0"/>
@@ -1374,38 +1405,53 @@
       </p:grpSpPr>
       <p:sp>
         <p:nvSpPr>
-          <p:cNvPr id="2" name="Title 1">
+          <p:cNvPr id="10" name="Rectangle 9">
             <a:extLst>
               <a:ext uri="{FF2B5EF4-FFF2-40B4-BE49-F238E27FC236}">
-                <a16:creationId xmlns:a16="http://schemas.microsoft.com/office/drawing/2014/main" id="{97F27902-5B27-8D4E-BAAF-86EE1B40D30A}"/>
+                <a16:creationId xmlns:a16="http://schemas.microsoft.com/office/drawing/2014/main" id="{FD16119A-F1FA-E54B-A886-E52F9393C801}"/>
               </a:ext>
             </a:extLst>
           </p:cNvPr>
-          <p:cNvSpPr>
-            <a:spLocks noGrp="1"/>
-          </p:cNvSpPr>
-          <p:nvPr>
-            <p:ph type="title"/>
-          </p:nvPr>
+          <p:cNvSpPr/>
+          <p:nvPr userDrawn="1"/>
         </p:nvSpPr>
         <p:spPr>
+          <a:xfrm>
+            <a:off x="0" y="0"/>
+            <a:ext cx="12192000" cy="501650"/>
+          </a:xfrm>
+          <a:prstGeom prst="rect">
+            <a:avLst/>
+          </a:prstGeom>
           <a:solidFill>
-            <a:schemeClr val="accent5">
-              <a:lumMod val="40000"/>
-              <a:lumOff val="60000"/>
+            <a:schemeClr val="accent1">
+              <a:lumMod val="20000"/>
+              <a:lumOff val="80000"/>
             </a:schemeClr>
           </a:solidFill>
-          <a:ln w="12700">
-            <a:solidFill>
-              <a:srgbClr val="2F528F"/>
-            </a:solidFill>
-          </a:ln>
         </p:spPr>
+        <p:style>
+          <a:lnRef idx="2">
+            <a:schemeClr val="accent1">
+              <a:shade val="50000"/>
+            </a:schemeClr>
+          </a:lnRef>
+          <a:fillRef idx="1">
+            <a:schemeClr val="accent1"/>
+          </a:fillRef>
+          <a:effectRef idx="0">
+            <a:schemeClr val="accent1"/>
+          </a:effectRef>
+          <a:fontRef idx="minor">
+            <a:schemeClr val="lt1"/>
+          </a:fontRef>
+        </p:style>
         <p:txBody>
-          <a:bodyPr/>
+          <a:bodyPr rtlCol="0" anchor="ctr"/>
           <a:lstStyle/>
           <a:p>
-            <a:endParaRPr lang="en-US" dirty="0"/>
+            <a:pPr algn="ctr"/>
+            <a:endParaRPr lang="en-US"/>
           </a:p>
         </p:txBody>
       </p:sp>
@@ -1436,6 +1482,11 @@
               <a:lumOff val="60000"/>
             </a:schemeClr>
           </a:solidFill>
+          <a:ln>
+            <a:solidFill>
+              <a:schemeClr val="accent1"/>
+            </a:solidFill>
+          </a:ln>
         </p:spPr>
         <p:txBody>
           <a:bodyPr/>
@@ -1456,57 +1507,7 @@
             <a:fld id="{689F9312-E64A-4DE9-B065-134A619B7E4E}" type="datetime4">
               <a:rPr lang="en-GB" smtClean="0"/>
               <a:pPr/>
-              <a:t>22 July 2020</a:t>
-            </a:fld>
-            <a:endParaRPr lang="en-GB" dirty="0"/>
-          </a:p>
-        </p:txBody>
-      </p:sp>
-      <p:sp>
-        <p:nvSpPr>
-          <p:cNvPr id="4" name="Slide Number Placeholder 3">
-            <a:extLst>
-              <a:ext uri="{FF2B5EF4-FFF2-40B4-BE49-F238E27FC236}">
-                <a16:creationId xmlns:a16="http://schemas.microsoft.com/office/drawing/2014/main" id="{C54DF046-6C35-5A43-A37C-4D7696478CAD}"/>
-              </a:ext>
-            </a:extLst>
-          </p:cNvPr>
-          <p:cNvSpPr>
-            <a:spLocks noGrp="1"/>
-          </p:cNvSpPr>
-          <p:nvPr>
-            <p:ph type="sldNum" sz="quarter" idx="11"/>
-          </p:nvPr>
-        </p:nvSpPr>
-        <p:spPr>
-          <a:xfrm>
-            <a:off x="10718799" y="6173786"/>
-            <a:ext cx="1208709" cy="365125"/>
-          </a:xfrm>
-          <a:solidFill>
-            <a:schemeClr val="bg2"/>
-          </a:solidFill>
-        </p:spPr>
-        <p:txBody>
-          <a:bodyPr/>
-          <a:lstStyle>
-            <a:lvl1pPr algn="ctr">
-              <a:defRPr sz="1800">
-                <a:solidFill>
-                  <a:schemeClr val="tx1"/>
-                </a:solidFill>
-              </a:defRPr>
-            </a:lvl1pPr>
-          </a:lstStyle>
-          <a:p>
-            <a:r>
-              <a:rPr lang="en-GB" dirty="0"/>
-              <a:t>Slide </a:t>
-            </a:r>
-            <a:fld id="{197E031E-CC7C-4FFD-B59E-418DD80E7695}" type="slidenum">
-              <a:rPr lang="en-GB" smtClean="0"/>
-              <a:pPr/>
-              <a:t>‹#›</a:t>
+              <a:t>27 July 2020</a:t>
             </a:fld>
             <a:endParaRPr lang="en-GB" dirty="0"/>
           </a:p>
@@ -1526,8 +1527,8 @@
         </p:nvSpPr>
         <p:spPr>
           <a:xfrm>
-            <a:off x="23190" y="98599"/>
-            <a:ext cx="4000198" cy="369332"/>
+            <a:off x="23190" y="70889"/>
+            <a:ext cx="6240683" cy="369332"/>
           </a:xfrm>
           <a:prstGeom prst="rect">
             <a:avLst/>
@@ -1542,7 +1543,11 @@
           <a:p>
             <a:r>
               <a:rPr lang="en-US" dirty="0"/>
-              <a:t>West Sussex Local Outbreak Control Plan</a:t>
+              <a:t>West Sussex Local Outbreak Control Plan – </a:t>
+            </a:r>
+            <a:r>
+              <a:rPr lang="en-US" b="1" dirty="0"/>
+              <a:t>Daily confirmed cases</a:t>
             </a:r>
           </a:p>
         </p:txBody>
@@ -1561,7 +1566,7 @@
         </p:nvSpPr>
         <p:spPr>
           <a:xfrm>
-            <a:off x="9319505" y="98599"/>
+            <a:off x="9319505" y="70889"/>
             <a:ext cx="2841996" cy="369332"/>
           </a:xfrm>
           <a:prstGeom prst="rect">
@@ -1606,8 +1611,8 @@
         </p:nvSpPr>
         <p:spPr>
           <a:xfrm>
-            <a:off x="7732090" y="5695950"/>
-            <a:ext cx="2110410" cy="365124"/>
+            <a:off x="7732089" y="5695950"/>
+            <a:ext cx="3919583" cy="365124"/>
           </a:xfrm>
           <a:prstGeom prst="rect">
             <a:avLst/>
@@ -1702,8 +1707,8 @@
         </p:nvSpPr>
         <p:spPr>
           <a:xfrm>
-            <a:off x="844550" y="796926"/>
-            <a:ext cx="10502900" cy="4775200"/>
+            <a:off x="387927" y="558684"/>
+            <a:ext cx="11263746" cy="5137266"/>
           </a:xfrm>
           <a:prstGeom prst="rect">
             <a:avLst/>
@@ -1717,10 +1722,946 @@
           </a:p>
         </p:txBody>
       </p:sp>
+      <p:sp>
+        <p:nvSpPr>
+          <p:cNvPr id="11" name="Text Placeholder 12">
+            <a:extLst>
+              <a:ext uri="{FF2B5EF4-FFF2-40B4-BE49-F238E27FC236}">
+                <a16:creationId xmlns:a16="http://schemas.microsoft.com/office/drawing/2014/main" id="{82F48795-E039-6C4D-A660-851F8ECFF754}"/>
+              </a:ext>
+            </a:extLst>
+          </p:cNvPr>
+          <p:cNvSpPr>
+            <a:spLocks noGrp="1"/>
+          </p:cNvSpPr>
+          <p:nvPr>
+            <p:ph type="body" sz="quarter" idx="17"/>
+          </p:nvPr>
+        </p:nvSpPr>
+        <p:spPr>
+          <a:xfrm>
+            <a:off x="10702754" y="6173785"/>
+            <a:ext cx="1236662" cy="365124"/>
+          </a:xfrm>
+          <a:prstGeom prst="rect">
+            <a:avLst/>
+          </a:prstGeom>
+          <a:solidFill>
+            <a:schemeClr val="bg1">
+              <a:lumMod val="85000"/>
+            </a:schemeClr>
+          </a:solidFill>
+        </p:spPr>
+        <p:txBody>
+          <a:bodyPr/>
+          <a:lstStyle>
+            <a:lvl1pPr marL="0" indent="0" algn="ctr">
+              <a:buNone/>
+              <a:defRPr sz="1800"/>
+            </a:lvl1pPr>
+            <a:lvl2pPr>
+              <a:defRPr sz="1100"/>
+            </a:lvl2pPr>
+            <a:lvl3pPr>
+              <a:defRPr sz="1100"/>
+            </a:lvl3pPr>
+            <a:lvl4pPr>
+              <a:defRPr sz="1100"/>
+            </a:lvl4pPr>
+            <a:lvl5pPr>
+              <a:defRPr sz="1100"/>
+            </a:lvl5pPr>
+          </a:lstStyle>
+          <a:p>
+            <a:pPr lvl="0"/>
+            <a:endParaRPr lang="en-US" dirty="0"/>
+          </a:p>
+        </p:txBody>
+      </p:sp>
     </p:spTree>
     <p:extLst>
       <p:ext uri="{BB962C8B-B14F-4D97-AF65-F5344CB8AC3E}">
         <p14:creationId xmlns:p14="http://schemas.microsoft.com/office/powerpoint/2010/main" val="3760846904"/>
+      </p:ext>
+    </p:extLst>
+  </p:cSld>
+  <p:clrMapOvr>
+    <a:masterClrMapping/>
+  </p:clrMapOvr>
+</p:sldLayout>
+</file>
+
+<file path=ppt/slideLayouts/slideLayout4.xml><?xml version="1.0" encoding="utf-8"?>
+<p:sldLayout xmlns:a="http://schemas.openxmlformats.org/drawingml/2006/main" xmlns:r="http://schemas.openxmlformats.org/officeDocument/2006/relationships" xmlns:p="http://schemas.openxmlformats.org/presentationml/2006/main" preserve="1" userDrawn="1">
+  <p:cSld name="Heatmap_layout">
+    <p:spTree>
+      <p:nvGrpSpPr>
+        <p:cNvPr id="1" name=""/>
+        <p:cNvGrpSpPr/>
+        <p:nvPr/>
+      </p:nvGrpSpPr>
+      <p:grpSpPr>
+        <a:xfrm>
+          <a:off x="0" y="0"/>
+          <a:ext cx="0" cy="0"/>
+          <a:chOff x="0" y="0"/>
+          <a:chExt cx="0" cy="0"/>
+        </a:xfrm>
+      </p:grpSpPr>
+      <p:sp>
+        <p:nvSpPr>
+          <p:cNvPr id="10" name="Rectangle 9">
+            <a:extLst>
+              <a:ext uri="{FF2B5EF4-FFF2-40B4-BE49-F238E27FC236}">
+                <a16:creationId xmlns:a16="http://schemas.microsoft.com/office/drawing/2014/main" id="{FD16119A-F1FA-E54B-A886-E52F9393C801}"/>
+              </a:ext>
+            </a:extLst>
+          </p:cNvPr>
+          <p:cNvSpPr/>
+          <p:nvPr userDrawn="1"/>
+        </p:nvSpPr>
+        <p:spPr>
+          <a:xfrm>
+            <a:off x="0" y="0"/>
+            <a:ext cx="12192000" cy="501650"/>
+          </a:xfrm>
+          <a:prstGeom prst="rect">
+            <a:avLst/>
+          </a:prstGeom>
+          <a:solidFill>
+            <a:schemeClr val="accent1">
+              <a:lumMod val="20000"/>
+              <a:lumOff val="80000"/>
+            </a:schemeClr>
+          </a:solidFill>
+        </p:spPr>
+        <p:style>
+          <a:lnRef idx="2">
+            <a:schemeClr val="accent1">
+              <a:shade val="50000"/>
+            </a:schemeClr>
+          </a:lnRef>
+          <a:fillRef idx="1">
+            <a:schemeClr val="accent1"/>
+          </a:fillRef>
+          <a:effectRef idx="0">
+            <a:schemeClr val="accent1"/>
+          </a:effectRef>
+          <a:fontRef idx="minor">
+            <a:schemeClr val="lt1"/>
+          </a:fontRef>
+        </p:style>
+        <p:txBody>
+          <a:bodyPr rtlCol="0" anchor="ctr"/>
+          <a:lstStyle/>
+          <a:p>
+            <a:pPr algn="ctr"/>
+            <a:endParaRPr lang="en-US"/>
+          </a:p>
+        </p:txBody>
+      </p:sp>
+      <p:sp>
+        <p:nvSpPr>
+          <p:cNvPr id="3" name="Date Placeholder 2">
+            <a:extLst>
+              <a:ext uri="{FF2B5EF4-FFF2-40B4-BE49-F238E27FC236}">
+                <a16:creationId xmlns:a16="http://schemas.microsoft.com/office/drawing/2014/main" id="{B9329E73-57FC-4349-B5D7-5E0288846FE1}"/>
+              </a:ext>
+            </a:extLst>
+          </p:cNvPr>
+          <p:cNvSpPr>
+            <a:spLocks noGrp="1"/>
+          </p:cNvSpPr>
+          <p:nvPr>
+            <p:ph type="dt" sz="half" idx="10"/>
+          </p:nvPr>
+        </p:nvSpPr>
+        <p:spPr>
+          <a:xfrm>
+            <a:off x="7732090" y="6340045"/>
+            <a:ext cx="2743200" cy="365125"/>
+          </a:xfrm>
+          <a:solidFill>
+            <a:schemeClr val="accent5">
+              <a:lumMod val="40000"/>
+              <a:lumOff val="60000"/>
+            </a:schemeClr>
+          </a:solidFill>
+          <a:ln>
+            <a:solidFill>
+              <a:schemeClr val="accent1"/>
+            </a:solidFill>
+          </a:ln>
+        </p:spPr>
+        <p:txBody>
+          <a:bodyPr/>
+          <a:lstStyle>
+            <a:lvl1pPr algn="ctr">
+              <a:defRPr sz="1600"/>
+            </a:lvl1pPr>
+          </a:lstStyle>
+          <a:p>
+            <a:r>
+              <a:rPr lang="en-GB" b="1"/>
+              <a:t>Pack Date</a:t>
+            </a:r>
+            <a:r>
+              <a:rPr lang="en-GB"/>
+              <a:t>: </a:t>
+            </a:r>
+            <a:fld id="{689F9312-E64A-4DE9-B065-134A619B7E4E}" type="datetime4">
+              <a:rPr lang="en-GB" smtClean="0"/>
+              <a:pPr/>
+              <a:t>27 July 2020</a:t>
+            </a:fld>
+            <a:endParaRPr lang="en-GB" dirty="0"/>
+          </a:p>
+        </p:txBody>
+      </p:sp>
+      <p:sp>
+        <p:nvSpPr>
+          <p:cNvPr id="5" name="TextBox 4">
+            <a:extLst>
+              <a:ext uri="{FF2B5EF4-FFF2-40B4-BE49-F238E27FC236}">
+                <a16:creationId xmlns:a16="http://schemas.microsoft.com/office/drawing/2014/main" id="{4938F9DD-41E4-3941-8465-9A7E35712BA3}"/>
+              </a:ext>
+            </a:extLst>
+          </p:cNvPr>
+          <p:cNvSpPr txBox="1"/>
+          <p:nvPr userDrawn="1"/>
+        </p:nvSpPr>
+        <p:spPr>
+          <a:xfrm>
+            <a:off x="23190" y="57034"/>
+            <a:ext cx="9064982" cy="369332"/>
+          </a:xfrm>
+          <a:prstGeom prst="rect">
+            <a:avLst/>
+          </a:prstGeom>
+          <a:noFill/>
+        </p:spPr>
+        <p:txBody>
+          <a:bodyPr wrap="none" rtlCol="0">
+            <a:spAutoFit/>
+          </a:bodyPr>
+          <a:lstStyle/>
+          <a:p>
+            <a:r>
+              <a:rPr lang="en-US" dirty="0"/>
+              <a:t>West Sussex Local Outbreak Control Plan – </a:t>
+            </a:r>
+            <a:r>
+              <a:rPr lang="en-US" b="1" dirty="0"/>
+              <a:t>Summary confirmed cases per 100,000 population</a:t>
+            </a:r>
+            <a:endParaRPr lang="en-US" dirty="0"/>
+          </a:p>
+        </p:txBody>
+      </p:sp>
+      <p:sp>
+        <p:nvSpPr>
+          <p:cNvPr id="6" name="TextBox 5">
+            <a:extLst>
+              <a:ext uri="{FF2B5EF4-FFF2-40B4-BE49-F238E27FC236}">
+                <a16:creationId xmlns:a16="http://schemas.microsoft.com/office/drawing/2014/main" id="{F8DCA3DF-FAB5-FE40-B157-F42D350D2897}"/>
+              </a:ext>
+            </a:extLst>
+          </p:cNvPr>
+          <p:cNvSpPr txBox="1"/>
+          <p:nvPr userDrawn="1"/>
+        </p:nvSpPr>
+        <p:spPr>
+          <a:xfrm>
+            <a:off x="9319505" y="57034"/>
+            <a:ext cx="2841996" cy="369332"/>
+          </a:xfrm>
+          <a:prstGeom prst="rect">
+            <a:avLst/>
+          </a:prstGeom>
+          <a:noFill/>
+        </p:spPr>
+        <p:txBody>
+          <a:bodyPr wrap="none" rtlCol="0">
+            <a:spAutoFit/>
+          </a:bodyPr>
+          <a:lstStyle/>
+          <a:p>
+            <a:r>
+              <a:rPr lang="en-US" b="1" dirty="0">
+                <a:solidFill>
+                  <a:schemeClr val="accent5">
+                    <a:lumMod val="75000"/>
+                  </a:schemeClr>
+                </a:solidFill>
+              </a:rPr>
+              <a:t>West Sussex County Council</a:t>
+            </a:r>
+          </a:p>
+        </p:txBody>
+      </p:sp>
+      <p:sp>
+        <p:nvSpPr>
+          <p:cNvPr id="16" name="Text Placeholder 15">
+            <a:extLst>
+              <a:ext uri="{FF2B5EF4-FFF2-40B4-BE49-F238E27FC236}">
+                <a16:creationId xmlns:a16="http://schemas.microsoft.com/office/drawing/2014/main" id="{5C581DD6-9338-A64E-925D-721712458729}"/>
+              </a:ext>
+            </a:extLst>
+          </p:cNvPr>
+          <p:cNvSpPr>
+            <a:spLocks noGrp="1"/>
+          </p:cNvSpPr>
+          <p:nvPr>
+            <p:ph type="body" sz="quarter" idx="15"/>
+          </p:nvPr>
+        </p:nvSpPr>
+        <p:spPr>
+          <a:xfrm>
+            <a:off x="103805" y="6356034"/>
+            <a:ext cx="3919583" cy="365124"/>
+          </a:xfrm>
+          <a:prstGeom prst="rect">
+            <a:avLst/>
+          </a:prstGeom>
+        </p:spPr>
+        <p:txBody>
+          <a:bodyPr/>
+          <a:lstStyle>
+            <a:lvl1pPr marL="0" indent="0">
+              <a:buNone/>
+              <a:defRPr sz="1200"/>
+            </a:lvl1pPr>
+          </a:lstStyle>
+          <a:p>
+            <a:pPr lvl="0"/>
+            <a:endParaRPr lang="en-US" dirty="0"/>
+          </a:p>
+        </p:txBody>
+      </p:sp>
+      <p:sp>
+        <p:nvSpPr>
+          <p:cNvPr id="9" name="Picture Placeholder 8">
+            <a:extLst>
+              <a:ext uri="{FF2B5EF4-FFF2-40B4-BE49-F238E27FC236}">
+                <a16:creationId xmlns:a16="http://schemas.microsoft.com/office/drawing/2014/main" id="{61D09168-0A4C-B549-95F3-28F302BD77A3}"/>
+              </a:ext>
+            </a:extLst>
+          </p:cNvPr>
+          <p:cNvSpPr>
+            <a:spLocks noGrp="1"/>
+          </p:cNvSpPr>
+          <p:nvPr>
+            <p:ph type="pic" sz="quarter" idx="16"/>
+          </p:nvPr>
+        </p:nvSpPr>
+        <p:spPr>
+          <a:xfrm>
+            <a:off x="235528" y="558683"/>
+            <a:ext cx="11703888" cy="5706078"/>
+          </a:xfrm>
+          <a:prstGeom prst="rect">
+            <a:avLst/>
+          </a:prstGeom>
+        </p:spPr>
+        <p:txBody>
+          <a:bodyPr/>
+          <a:lstStyle/>
+          <a:p>
+            <a:endParaRPr lang="en-US"/>
+          </a:p>
+        </p:txBody>
+      </p:sp>
+      <p:sp>
+        <p:nvSpPr>
+          <p:cNvPr id="12" name="Text Placeholder 12">
+            <a:extLst>
+              <a:ext uri="{FF2B5EF4-FFF2-40B4-BE49-F238E27FC236}">
+                <a16:creationId xmlns:a16="http://schemas.microsoft.com/office/drawing/2014/main" id="{E9F2A4FD-369F-E648-A7E7-504549F50B29}"/>
+              </a:ext>
+            </a:extLst>
+          </p:cNvPr>
+          <p:cNvSpPr>
+            <a:spLocks noGrp="1"/>
+          </p:cNvSpPr>
+          <p:nvPr>
+            <p:ph type="body" sz="quarter" idx="17"/>
+          </p:nvPr>
+        </p:nvSpPr>
+        <p:spPr>
+          <a:xfrm>
+            <a:off x="10702754" y="6340045"/>
+            <a:ext cx="1236662" cy="365124"/>
+          </a:xfrm>
+          <a:prstGeom prst="rect">
+            <a:avLst/>
+          </a:prstGeom>
+          <a:solidFill>
+            <a:schemeClr val="bg1">
+              <a:lumMod val="85000"/>
+            </a:schemeClr>
+          </a:solidFill>
+        </p:spPr>
+        <p:txBody>
+          <a:bodyPr/>
+          <a:lstStyle>
+            <a:lvl1pPr marL="0" indent="0" algn="ctr">
+              <a:buNone/>
+              <a:defRPr sz="1800"/>
+            </a:lvl1pPr>
+            <a:lvl2pPr>
+              <a:defRPr sz="1100"/>
+            </a:lvl2pPr>
+            <a:lvl3pPr>
+              <a:defRPr sz="1100"/>
+            </a:lvl3pPr>
+            <a:lvl4pPr>
+              <a:defRPr sz="1100"/>
+            </a:lvl4pPr>
+            <a:lvl5pPr>
+              <a:defRPr sz="1100"/>
+            </a:lvl5pPr>
+          </a:lstStyle>
+          <a:p>
+            <a:pPr lvl="0"/>
+            <a:endParaRPr lang="en-US" dirty="0"/>
+          </a:p>
+        </p:txBody>
+      </p:sp>
+    </p:spTree>
+    <p:extLst>
+      <p:ext uri="{BB962C8B-B14F-4D97-AF65-F5344CB8AC3E}">
+        <p14:creationId xmlns:p14="http://schemas.microsoft.com/office/powerpoint/2010/main" val="2777235898"/>
+      </p:ext>
+    </p:extLst>
+  </p:cSld>
+  <p:clrMapOvr>
+    <a:masterClrMapping/>
+  </p:clrMapOvr>
+</p:sldLayout>
+</file>
+
+<file path=ppt/slideLayouts/slideLayout5.xml><?xml version="1.0" encoding="utf-8"?>
+<p:sldLayout xmlns:a="http://schemas.openxmlformats.org/drawingml/2006/main" xmlns:r="http://schemas.openxmlformats.org/officeDocument/2006/relationships" xmlns:p="http://schemas.openxmlformats.org/presentationml/2006/main" preserve="1" userDrawn="1">
+  <p:cSld name="rate_map_layout">
+    <p:spTree>
+      <p:nvGrpSpPr>
+        <p:cNvPr id="1" name=""/>
+        <p:cNvGrpSpPr/>
+        <p:nvPr/>
+      </p:nvGrpSpPr>
+      <p:grpSpPr>
+        <a:xfrm>
+          <a:off x="0" y="0"/>
+          <a:ext cx="0" cy="0"/>
+          <a:chOff x="0" y="0"/>
+          <a:chExt cx="0" cy="0"/>
+        </a:xfrm>
+      </p:grpSpPr>
+      <p:sp>
+        <p:nvSpPr>
+          <p:cNvPr id="9" name="Picture Placeholder 8">
+            <a:extLst>
+              <a:ext uri="{FF2B5EF4-FFF2-40B4-BE49-F238E27FC236}">
+                <a16:creationId xmlns:a16="http://schemas.microsoft.com/office/drawing/2014/main" id="{61D09168-0A4C-B549-95F3-28F302BD77A3}"/>
+              </a:ext>
+            </a:extLst>
+          </p:cNvPr>
+          <p:cNvSpPr>
+            <a:spLocks noGrp="1"/>
+          </p:cNvSpPr>
+          <p:nvPr>
+            <p:ph type="pic" sz="quarter" idx="16"/>
+          </p:nvPr>
+        </p:nvSpPr>
+        <p:spPr>
+          <a:xfrm>
+            <a:off x="5458691" y="558683"/>
+            <a:ext cx="6480725" cy="6170328"/>
+          </a:xfrm>
+          <a:prstGeom prst="rect">
+            <a:avLst/>
+          </a:prstGeom>
+        </p:spPr>
+        <p:txBody>
+          <a:bodyPr/>
+          <a:lstStyle/>
+          <a:p>
+            <a:endParaRPr lang="en-US"/>
+          </a:p>
+        </p:txBody>
+      </p:sp>
+      <p:sp>
+        <p:nvSpPr>
+          <p:cNvPr id="10" name="Rectangle 9">
+            <a:extLst>
+              <a:ext uri="{FF2B5EF4-FFF2-40B4-BE49-F238E27FC236}">
+                <a16:creationId xmlns:a16="http://schemas.microsoft.com/office/drawing/2014/main" id="{FD16119A-F1FA-E54B-A886-E52F9393C801}"/>
+              </a:ext>
+            </a:extLst>
+          </p:cNvPr>
+          <p:cNvSpPr/>
+          <p:nvPr userDrawn="1"/>
+        </p:nvSpPr>
+        <p:spPr>
+          <a:xfrm>
+            <a:off x="0" y="0"/>
+            <a:ext cx="12192000" cy="501650"/>
+          </a:xfrm>
+          <a:prstGeom prst="rect">
+            <a:avLst/>
+          </a:prstGeom>
+          <a:solidFill>
+            <a:schemeClr val="accent1">
+              <a:lumMod val="20000"/>
+              <a:lumOff val="80000"/>
+            </a:schemeClr>
+          </a:solidFill>
+        </p:spPr>
+        <p:style>
+          <a:lnRef idx="2">
+            <a:schemeClr val="accent1">
+              <a:shade val="50000"/>
+            </a:schemeClr>
+          </a:lnRef>
+          <a:fillRef idx="1">
+            <a:schemeClr val="accent1"/>
+          </a:fillRef>
+          <a:effectRef idx="0">
+            <a:schemeClr val="accent1"/>
+          </a:effectRef>
+          <a:fontRef idx="minor">
+            <a:schemeClr val="lt1"/>
+          </a:fontRef>
+        </p:style>
+        <p:txBody>
+          <a:bodyPr rtlCol="0" anchor="ctr"/>
+          <a:lstStyle/>
+          <a:p>
+            <a:pPr algn="ctr"/>
+            <a:endParaRPr lang="en-US"/>
+          </a:p>
+        </p:txBody>
+      </p:sp>
+      <p:sp>
+        <p:nvSpPr>
+          <p:cNvPr id="3" name="Date Placeholder 2">
+            <a:extLst>
+              <a:ext uri="{FF2B5EF4-FFF2-40B4-BE49-F238E27FC236}">
+                <a16:creationId xmlns:a16="http://schemas.microsoft.com/office/drawing/2014/main" id="{B9329E73-57FC-4349-B5D7-5E0288846FE1}"/>
+              </a:ext>
+            </a:extLst>
+          </p:cNvPr>
+          <p:cNvSpPr>
+            <a:spLocks noGrp="1"/>
+          </p:cNvSpPr>
+          <p:nvPr>
+            <p:ph type="dt" sz="half" idx="10"/>
+          </p:nvPr>
+        </p:nvSpPr>
+        <p:spPr>
+          <a:xfrm>
+            <a:off x="7732090" y="6340045"/>
+            <a:ext cx="2743200" cy="365125"/>
+          </a:xfrm>
+          <a:solidFill>
+            <a:schemeClr val="accent5">
+              <a:lumMod val="40000"/>
+              <a:lumOff val="60000"/>
+            </a:schemeClr>
+          </a:solidFill>
+          <a:ln>
+            <a:solidFill>
+              <a:schemeClr val="accent1"/>
+            </a:solidFill>
+          </a:ln>
+        </p:spPr>
+        <p:txBody>
+          <a:bodyPr/>
+          <a:lstStyle>
+            <a:lvl1pPr algn="ctr">
+              <a:defRPr sz="1600"/>
+            </a:lvl1pPr>
+          </a:lstStyle>
+          <a:p>
+            <a:r>
+              <a:rPr lang="en-GB" b="1"/>
+              <a:t>Pack Date</a:t>
+            </a:r>
+            <a:r>
+              <a:rPr lang="en-GB"/>
+              <a:t>: </a:t>
+            </a:r>
+            <a:fld id="{689F9312-E64A-4DE9-B065-134A619B7E4E}" type="datetime4">
+              <a:rPr lang="en-GB" smtClean="0"/>
+              <a:pPr/>
+              <a:t>27 July 2020</a:t>
+            </a:fld>
+            <a:endParaRPr lang="en-GB" dirty="0"/>
+          </a:p>
+        </p:txBody>
+      </p:sp>
+      <p:sp>
+        <p:nvSpPr>
+          <p:cNvPr id="5" name="TextBox 4">
+            <a:extLst>
+              <a:ext uri="{FF2B5EF4-FFF2-40B4-BE49-F238E27FC236}">
+                <a16:creationId xmlns:a16="http://schemas.microsoft.com/office/drawing/2014/main" id="{4938F9DD-41E4-3941-8465-9A7E35712BA3}"/>
+              </a:ext>
+            </a:extLst>
+          </p:cNvPr>
+          <p:cNvSpPr txBox="1"/>
+          <p:nvPr userDrawn="1"/>
+        </p:nvSpPr>
+        <p:spPr>
+          <a:xfrm>
+            <a:off x="23190" y="57034"/>
+            <a:ext cx="9180655" cy="369332"/>
+          </a:xfrm>
+          <a:prstGeom prst="rect">
+            <a:avLst/>
+          </a:prstGeom>
+          <a:noFill/>
+        </p:spPr>
+        <p:txBody>
+          <a:bodyPr wrap="none" rtlCol="0">
+            <a:spAutoFit/>
+          </a:bodyPr>
+          <a:lstStyle/>
+          <a:p>
+            <a:r>
+              <a:rPr lang="en-US" dirty="0"/>
+              <a:t>West Sussex Local Outbreak Control Plan – </a:t>
+            </a:r>
+            <a:r>
+              <a:rPr lang="en-US" b="1" dirty="0"/>
+              <a:t>Cumulative confirmed cases per 100,000 population</a:t>
+            </a:r>
+            <a:endParaRPr lang="en-US" dirty="0"/>
+          </a:p>
+        </p:txBody>
+      </p:sp>
+      <p:sp>
+        <p:nvSpPr>
+          <p:cNvPr id="6" name="TextBox 5">
+            <a:extLst>
+              <a:ext uri="{FF2B5EF4-FFF2-40B4-BE49-F238E27FC236}">
+                <a16:creationId xmlns:a16="http://schemas.microsoft.com/office/drawing/2014/main" id="{F8DCA3DF-FAB5-FE40-B157-F42D350D2897}"/>
+              </a:ext>
+            </a:extLst>
+          </p:cNvPr>
+          <p:cNvSpPr txBox="1"/>
+          <p:nvPr userDrawn="1"/>
+        </p:nvSpPr>
+        <p:spPr>
+          <a:xfrm>
+            <a:off x="9319505" y="57034"/>
+            <a:ext cx="2841996" cy="369332"/>
+          </a:xfrm>
+          <a:prstGeom prst="rect">
+            <a:avLst/>
+          </a:prstGeom>
+          <a:noFill/>
+        </p:spPr>
+        <p:txBody>
+          <a:bodyPr wrap="none" rtlCol="0">
+            <a:spAutoFit/>
+          </a:bodyPr>
+          <a:lstStyle/>
+          <a:p>
+            <a:r>
+              <a:rPr lang="en-US" b="1" dirty="0">
+                <a:solidFill>
+                  <a:schemeClr val="accent5">
+                    <a:lumMod val="75000"/>
+                  </a:schemeClr>
+                </a:solidFill>
+              </a:rPr>
+              <a:t>West Sussex County Council</a:t>
+            </a:r>
+          </a:p>
+        </p:txBody>
+      </p:sp>
+      <p:sp>
+        <p:nvSpPr>
+          <p:cNvPr id="16" name="Text Placeholder 15">
+            <a:extLst>
+              <a:ext uri="{FF2B5EF4-FFF2-40B4-BE49-F238E27FC236}">
+                <a16:creationId xmlns:a16="http://schemas.microsoft.com/office/drawing/2014/main" id="{5C581DD6-9338-A64E-925D-721712458729}"/>
+              </a:ext>
+            </a:extLst>
+          </p:cNvPr>
+          <p:cNvSpPr>
+            <a:spLocks noGrp="1"/>
+          </p:cNvSpPr>
+          <p:nvPr>
+            <p:ph type="body" sz="quarter" idx="15"/>
+          </p:nvPr>
+        </p:nvSpPr>
+        <p:spPr>
+          <a:xfrm>
+            <a:off x="103805" y="6356034"/>
+            <a:ext cx="3919583" cy="365124"/>
+          </a:xfrm>
+          <a:prstGeom prst="rect">
+            <a:avLst/>
+          </a:prstGeom>
+        </p:spPr>
+        <p:txBody>
+          <a:bodyPr/>
+          <a:lstStyle>
+            <a:lvl1pPr marL="0" indent="0">
+              <a:buNone/>
+              <a:defRPr sz="1200"/>
+            </a:lvl1pPr>
+          </a:lstStyle>
+          <a:p>
+            <a:pPr lvl="0"/>
+            <a:endParaRPr lang="en-US" dirty="0"/>
+          </a:p>
+        </p:txBody>
+      </p:sp>
+      <p:sp>
+        <p:nvSpPr>
+          <p:cNvPr id="4" name="Text Placeholder 3">
+            <a:extLst>
+              <a:ext uri="{FF2B5EF4-FFF2-40B4-BE49-F238E27FC236}">
+                <a16:creationId xmlns:a16="http://schemas.microsoft.com/office/drawing/2014/main" id="{4410E28A-A53D-C948-BD95-2D652E1ACEF1}"/>
+              </a:ext>
+            </a:extLst>
+          </p:cNvPr>
+          <p:cNvSpPr>
+            <a:spLocks noGrp="1"/>
+          </p:cNvSpPr>
+          <p:nvPr>
+            <p:ph type="body" sz="quarter" idx="18"/>
+          </p:nvPr>
+        </p:nvSpPr>
+        <p:spPr>
+          <a:xfrm>
+            <a:off x="103188" y="593725"/>
+            <a:ext cx="5092700" cy="458788"/>
+          </a:xfrm>
+          <a:prstGeom prst="rect">
+            <a:avLst/>
+          </a:prstGeom>
+        </p:spPr>
+        <p:txBody>
+          <a:bodyPr/>
+          <a:lstStyle>
+            <a:lvl1pPr marL="0" indent="0">
+              <a:buNone/>
+              <a:defRPr sz="2000" b="1"/>
+            </a:lvl1pPr>
+          </a:lstStyle>
+          <a:p>
+            <a:pPr lvl="0"/>
+            <a:endParaRPr lang="en-US" dirty="0"/>
+          </a:p>
+        </p:txBody>
+      </p:sp>
+      <p:sp>
+        <p:nvSpPr>
+          <p:cNvPr id="8" name="Table Placeholder 7">
+            <a:extLst>
+              <a:ext uri="{FF2B5EF4-FFF2-40B4-BE49-F238E27FC236}">
+                <a16:creationId xmlns:a16="http://schemas.microsoft.com/office/drawing/2014/main" id="{795D18AB-147A-FC48-9BA5-A0E98D22616F}"/>
+              </a:ext>
+            </a:extLst>
+          </p:cNvPr>
+          <p:cNvSpPr>
+            <a:spLocks noGrp="1"/>
+          </p:cNvSpPr>
+          <p:nvPr>
+            <p:ph type="tbl" sz="quarter" idx="19"/>
+          </p:nvPr>
+        </p:nvSpPr>
+        <p:spPr>
+          <a:xfrm>
+            <a:off x="103188" y="1177925"/>
+            <a:ext cx="5868121" cy="2535238"/>
+          </a:xfrm>
+          <a:prstGeom prst="rect">
+            <a:avLst/>
+          </a:prstGeom>
+        </p:spPr>
+        <p:txBody>
+          <a:bodyPr/>
+          <a:lstStyle>
+            <a:lvl1pPr marL="0" indent="0">
+              <a:buNone/>
+              <a:defRPr sz="1200"/>
+            </a:lvl1pPr>
+          </a:lstStyle>
+          <a:p>
+            <a:endParaRPr lang="en-US" dirty="0"/>
+          </a:p>
+        </p:txBody>
+      </p:sp>
+      <p:sp>
+        <p:nvSpPr>
+          <p:cNvPr id="13" name="Text Placeholder 12">
+            <a:extLst>
+              <a:ext uri="{FF2B5EF4-FFF2-40B4-BE49-F238E27FC236}">
+                <a16:creationId xmlns:a16="http://schemas.microsoft.com/office/drawing/2014/main" id="{395C11DC-098C-5549-8CFB-092A0977A3D7}"/>
+              </a:ext>
+            </a:extLst>
+          </p:cNvPr>
+          <p:cNvSpPr>
+            <a:spLocks noGrp="1"/>
+          </p:cNvSpPr>
+          <p:nvPr>
+            <p:ph type="body" sz="quarter" idx="20"/>
+          </p:nvPr>
+        </p:nvSpPr>
+        <p:spPr>
+          <a:xfrm>
+            <a:off x="103188" y="4489450"/>
+            <a:ext cx="3319462" cy="360363"/>
+          </a:xfrm>
+          <a:prstGeom prst="rect">
+            <a:avLst/>
+          </a:prstGeom>
+        </p:spPr>
+        <p:txBody>
+          <a:bodyPr/>
+          <a:lstStyle>
+            <a:lvl1pPr marL="0" indent="0">
+              <a:buNone/>
+              <a:defRPr sz="1400" b="1"/>
+            </a:lvl1pPr>
+          </a:lstStyle>
+          <a:p>
+            <a:pPr lvl="0"/>
+            <a:endParaRPr lang="en-US" dirty="0"/>
+          </a:p>
+        </p:txBody>
+      </p:sp>
+      <p:sp>
+        <p:nvSpPr>
+          <p:cNvPr id="15" name="Text Placeholder 14">
+            <a:extLst>
+              <a:ext uri="{FF2B5EF4-FFF2-40B4-BE49-F238E27FC236}">
+                <a16:creationId xmlns:a16="http://schemas.microsoft.com/office/drawing/2014/main" id="{B93514E5-FE36-634D-9E73-F29746CF3DA4}"/>
+              </a:ext>
+            </a:extLst>
+          </p:cNvPr>
+          <p:cNvSpPr>
+            <a:spLocks noGrp="1"/>
+          </p:cNvSpPr>
+          <p:nvPr>
+            <p:ph type="body" sz="quarter" idx="21"/>
+          </p:nvPr>
+        </p:nvSpPr>
+        <p:spPr>
+          <a:xfrm>
+            <a:off x="103188" y="4738973"/>
+            <a:ext cx="5729576" cy="776287"/>
+          </a:xfrm>
+          <a:prstGeom prst="rect">
+            <a:avLst/>
+          </a:prstGeom>
+        </p:spPr>
+        <p:txBody>
+          <a:bodyPr/>
+          <a:lstStyle>
+            <a:lvl1pPr marL="0" indent="0">
+              <a:buNone/>
+              <a:defRPr sz="1200"/>
+            </a:lvl1pPr>
+          </a:lstStyle>
+          <a:p>
+            <a:pPr lvl="0"/>
+            <a:endParaRPr lang="en-US" dirty="0"/>
+          </a:p>
+        </p:txBody>
+      </p:sp>
+      <p:sp>
+        <p:nvSpPr>
+          <p:cNvPr id="7" name="Text Placeholder 6">
+            <a:extLst>
+              <a:ext uri="{FF2B5EF4-FFF2-40B4-BE49-F238E27FC236}">
+                <a16:creationId xmlns:a16="http://schemas.microsoft.com/office/drawing/2014/main" id="{4774C634-368F-2B4C-8415-8945BBF567FC}"/>
+              </a:ext>
+            </a:extLst>
+          </p:cNvPr>
+          <p:cNvSpPr>
+            <a:spLocks noGrp="1"/>
+          </p:cNvSpPr>
+          <p:nvPr>
+            <p:ph type="body" sz="quarter" idx="22"/>
+          </p:nvPr>
+        </p:nvSpPr>
+        <p:spPr>
+          <a:xfrm>
+            <a:off x="103188" y="5744369"/>
+            <a:ext cx="5729576" cy="484188"/>
+          </a:xfrm>
+          <a:prstGeom prst="rect">
+            <a:avLst/>
+          </a:prstGeom>
+        </p:spPr>
+        <p:txBody>
+          <a:bodyPr/>
+          <a:lstStyle>
+            <a:lvl1pPr marL="0" indent="0">
+              <a:buNone/>
+              <a:defRPr sz="1600" b="1"/>
+            </a:lvl1pPr>
+          </a:lstStyle>
+          <a:p>
+            <a:pPr lvl="0"/>
+            <a:endParaRPr lang="en-US" dirty="0"/>
+          </a:p>
+        </p:txBody>
+      </p:sp>
+      <p:sp>
+        <p:nvSpPr>
+          <p:cNvPr id="20" name="Text Placeholder 19">
+            <a:extLst>
+              <a:ext uri="{FF2B5EF4-FFF2-40B4-BE49-F238E27FC236}">
+                <a16:creationId xmlns:a16="http://schemas.microsoft.com/office/drawing/2014/main" id="{C04E09D3-472C-6E4E-9DAD-571877904427}"/>
+              </a:ext>
+            </a:extLst>
+          </p:cNvPr>
+          <p:cNvSpPr>
+            <a:spLocks noGrp="1"/>
+          </p:cNvSpPr>
+          <p:nvPr>
+            <p:ph type="body" sz="quarter" idx="23"/>
+          </p:nvPr>
+        </p:nvSpPr>
+        <p:spPr>
+          <a:xfrm>
+            <a:off x="10702753" y="6350031"/>
+            <a:ext cx="1236663" cy="365125"/>
+          </a:xfrm>
+          <a:prstGeom prst="rect">
+            <a:avLst/>
+          </a:prstGeom>
+          <a:solidFill>
+            <a:schemeClr val="bg1">
+              <a:lumMod val="85000"/>
+            </a:schemeClr>
+          </a:solidFill>
+        </p:spPr>
+        <p:txBody>
+          <a:bodyPr/>
+          <a:lstStyle>
+            <a:lvl1pPr marL="0" indent="0" algn="ctr">
+              <a:buNone/>
+              <a:defRPr sz="1800"/>
+            </a:lvl1pPr>
+          </a:lstStyle>
+          <a:p>
+            <a:pPr lvl="0"/>
+            <a:endParaRPr lang="en-US" dirty="0"/>
+          </a:p>
+        </p:txBody>
+      </p:sp>
+    </p:spTree>
+    <p:extLst>
+      <p:ext uri="{BB962C8B-B14F-4D97-AF65-F5344CB8AC3E}">
+        <p14:creationId xmlns:p14="http://schemas.microsoft.com/office/powerpoint/2010/main" val="3431497624"/>
       </p:ext>
     </p:extLst>
   </p:cSld>
@@ -1843,7 +2784,7 @@
             <a:fld id="{689F9312-E64A-4DE9-B065-134A619B7E4E}" type="datetime4">
               <a:rPr lang="en-GB" smtClean="0"/>
               <a:pPr/>
-              <a:t>22 July 2020</a:t>
+              <a:t>27 July 2020</a:t>
             </a:fld>
             <a:endParaRPr lang="en-GB" dirty="0"/>
           </a:p>
@@ -1908,6 +2849,8 @@
     <p:sldLayoutId id="2147483649" r:id="rId1"/>
     <p:sldLayoutId id="2147483660" r:id="rId2"/>
     <p:sldLayoutId id="2147483661" r:id="rId3"/>
+    <p:sldLayoutId id="2147483662" r:id="rId4"/>
+    <p:sldLayoutId id="2147483663" r:id="rId5"/>
   </p:sldLayoutIdLst>
   <p:hf hdr="0"/>
   <p:txStyles>
@@ -2228,8 +3171,8 @@
         </p:nvSpPr>
         <p:spPr>
           <a:xfrm>
-            <a:off x="10913164" y="6252478"/>
-            <a:ext cx="1113183" cy="480735"/>
+            <a:off x="10852701" y="6490738"/>
+            <a:ext cx="1160672" cy="338554"/>
           </a:xfrm>
           <a:solidFill>
             <a:schemeClr val="accent3">
@@ -2244,7 +3187,7 @@
           <a:p>
             <a:pPr algn="ctr"/>
             <a:r>
-              <a:rPr lang="en-GB" sz="1800" dirty="0">
+              <a:rPr lang="en-GB" sz="1600" dirty="0">
                 <a:solidFill>
                   <a:schemeClr val="tx1"/>
                 </a:solidFill>
@@ -2252,7 +3195,7 @@
               <a:t>Slide </a:t>
             </a:r>
             <a:fld id="{197E031E-CC7C-4FFD-B59E-418DD80E7695}" type="slidenum">
-              <a:rPr lang="en-GB" sz="1800" smtClean="0">
+              <a:rPr lang="en-GB" sz="1600" smtClean="0">
                 <a:solidFill>
                   <a:schemeClr val="tx1"/>
                 </a:solidFill>
@@ -2260,7 +3203,7 @@
               <a:pPr algn="ctr"/>
               <a:t>1</a:t>
             </a:fld>
-            <a:endParaRPr lang="en-GB" sz="1800" dirty="0">
+            <a:endParaRPr lang="en-GB" sz="1600" dirty="0">
               <a:solidFill>
                 <a:schemeClr val="tx1"/>
               </a:solidFill>
@@ -2282,10 +3225,10 @@
         </p:nvGrpSpPr>
         <p:grpSpPr>
           <a:xfrm>
-            <a:off x="0" y="0"/>
-            <a:ext cx="12192000" cy="642026"/>
+            <a:off x="0" y="1"/>
+            <a:ext cx="12192000" cy="538282"/>
             <a:chOff x="0" y="0"/>
-            <a:chExt cx="12192000" cy="642026"/>
+            <a:chExt cx="12192000" cy="728021"/>
           </a:xfrm>
         </p:grpSpPr>
         <p:sp>
@@ -2361,494 +3304,7 @@
           </p:nvSpPr>
           <p:spPr>
             <a:xfrm>
-              <a:off x="190500" y="133220"/>
-              <a:ext cx="4000198" cy="369332"/>
-            </a:xfrm>
-            <a:prstGeom prst="rect">
-              <a:avLst/>
-            </a:prstGeom>
-            <a:noFill/>
-          </p:spPr>
-          <p:txBody>
-            <a:bodyPr wrap="none" rtlCol="0">
-              <a:spAutoFit/>
-            </a:bodyPr>
-            <a:lstStyle/>
-            <a:p>
-              <a:r>
-                <a:rPr lang="en-GB" dirty="0"/>
-                <a:t>West Sussex Local Outbreak Control Plan</a:t>
-              </a:r>
-              <a:endParaRPr lang="en-GB" b="1" dirty="0"/>
-            </a:p>
-          </p:txBody>
-        </p:sp>
-      </p:grpSp>
-      <p:sp>
-        <p:nvSpPr>
-          <p:cNvPr id="10" name="TextBox 9">
-            <a:extLst>
-              <a:ext uri="{FF2B5EF4-FFF2-40B4-BE49-F238E27FC236}">
-                <a16:creationId xmlns:a16="http://schemas.microsoft.com/office/drawing/2014/main" id="{FDF2C200-6D99-43A4-B069-34DA69095BFD}"/>
-              </a:ext>
-            </a:extLst>
-          </p:cNvPr>
-          <p:cNvSpPr txBox="1"/>
-          <p:nvPr/>
-        </p:nvSpPr>
-        <p:spPr>
-          <a:xfrm>
-            <a:off x="238320" y="2490570"/>
-            <a:ext cx="11788028" cy="2554545"/>
-          </a:xfrm>
-          <a:prstGeom prst="rect">
-            <a:avLst/>
-          </a:prstGeom>
-          <a:noFill/>
-        </p:spPr>
-        <p:txBody>
-          <a:bodyPr wrap="square" rtlCol="0">
-            <a:spAutoFit/>
-          </a:bodyPr>
-          <a:lstStyle/>
-          <a:p>
-            <a:r>
-              <a:rPr lang="en-GB" sz="2000" dirty="0"/>
-              <a:t>This pack brings together information relating to COVID-19 in West Sussex. </a:t>
-            </a:r>
-          </a:p>
-          <a:p>
-            <a:endParaRPr lang="en-GB" sz="2000" dirty="0"/>
-          </a:p>
-          <a:p>
-            <a:r>
-              <a:rPr lang="en-GB" sz="2000" dirty="0"/>
-              <a:t>West Sussex County Council Public Health Department monitors information on a daily basis, summary packs will be published weekly. Links are provided to the public data sources available, a summary of current sources is provided at the end of this pack.</a:t>
-            </a:r>
-          </a:p>
-          <a:p>
-            <a:endParaRPr lang="en-GB" sz="2000" dirty="0"/>
-          </a:p>
-          <a:p>
-            <a:r>
-              <a:rPr lang="en-GB" sz="2000" dirty="0"/>
-              <a:t>Local authorities have access to some information that is not in the public domain, this may be due to small numbers or data being provisional. </a:t>
-            </a:r>
-          </a:p>
-        </p:txBody>
-      </p:sp>
-      <p:sp>
-        <p:nvSpPr>
-          <p:cNvPr id="11" name="TextBox 10">
-            <a:extLst>
-              <a:ext uri="{FF2B5EF4-FFF2-40B4-BE49-F238E27FC236}">
-                <a16:creationId xmlns:a16="http://schemas.microsoft.com/office/drawing/2014/main" id="{01EE5419-9C2E-49A9-AFE0-D4B05538E376}"/>
-              </a:ext>
-            </a:extLst>
-          </p:cNvPr>
-          <p:cNvSpPr txBox="1"/>
-          <p:nvPr/>
-        </p:nvSpPr>
-        <p:spPr>
-          <a:xfrm>
-            <a:off x="238319" y="5534561"/>
-            <a:ext cx="6828184" cy="1323439"/>
-          </a:xfrm>
-          <a:prstGeom prst="rect">
-            <a:avLst/>
-          </a:prstGeom>
-          <a:noFill/>
-        </p:spPr>
-        <p:txBody>
-          <a:bodyPr wrap="square" rtlCol="0">
-            <a:spAutoFit/>
-          </a:bodyPr>
-          <a:lstStyle/>
-          <a:p>
-            <a:r>
-              <a:rPr lang="en-GB" sz="2000" b="1" dirty="0"/>
-              <a:t>Contact</a:t>
-            </a:r>
-          </a:p>
-          <a:p>
-            <a:r>
-              <a:rPr lang="en-GB" sz="2000" dirty="0">
-                <a:solidFill>
-                  <a:schemeClr val="accent1"/>
-                </a:solidFill>
-                <a:hlinkClick r:id="rId2"/>
-              </a:rPr>
-              <a:t>publichealth@westsussex.gov.uk</a:t>
-            </a:r>
-            <a:endParaRPr lang="en-GB" sz="2000" dirty="0">
-              <a:solidFill>
-                <a:schemeClr val="accent1"/>
-              </a:solidFill>
-            </a:endParaRPr>
-          </a:p>
-          <a:p>
-            <a:endParaRPr lang="en-GB" sz="2000" dirty="0">
-              <a:solidFill>
-                <a:schemeClr val="accent1"/>
-              </a:solidFill>
-            </a:endParaRPr>
-          </a:p>
-          <a:p>
-            <a:endParaRPr lang="en-GB" sz="2000" dirty="0"/>
-          </a:p>
-        </p:txBody>
-      </p:sp>
-      <p:sp>
-        <p:nvSpPr>
-          <p:cNvPr id="6" name="TextBox 5">
-            <a:extLst>
-              <a:ext uri="{FF2B5EF4-FFF2-40B4-BE49-F238E27FC236}">
-                <a16:creationId xmlns:a16="http://schemas.microsoft.com/office/drawing/2014/main" id="{EEF8BBFE-9399-4754-8397-DF231002752A}"/>
-              </a:ext>
-            </a:extLst>
-          </p:cNvPr>
-          <p:cNvSpPr txBox="1"/>
-          <p:nvPr/>
-        </p:nvSpPr>
-        <p:spPr>
-          <a:xfrm>
-            <a:off x="8300720" y="133220"/>
-            <a:ext cx="3725627" cy="369332"/>
-          </a:xfrm>
-          <a:prstGeom prst="rect">
-            <a:avLst/>
-          </a:prstGeom>
-          <a:noFill/>
-        </p:spPr>
-        <p:txBody>
-          <a:bodyPr wrap="square" rtlCol="0">
-            <a:spAutoFit/>
-          </a:bodyPr>
-          <a:lstStyle/>
-          <a:p>
-            <a:pPr algn="r"/>
-            <a:r>
-              <a:rPr lang="en-GB" b="1" dirty="0">
-                <a:solidFill>
-                  <a:schemeClr val="accent5">
-                    <a:lumMod val="75000"/>
-                  </a:schemeClr>
-                </a:solidFill>
-              </a:rPr>
-              <a:t>West Sussex County Council</a:t>
-            </a:r>
-          </a:p>
-        </p:txBody>
-      </p:sp>
-      <p:sp>
-        <p:nvSpPr>
-          <p:cNvPr id="13" name="TextBox 12">
-            <a:extLst>
-              <a:ext uri="{FF2B5EF4-FFF2-40B4-BE49-F238E27FC236}">
-                <a16:creationId xmlns:a16="http://schemas.microsoft.com/office/drawing/2014/main" id="{1249BB37-171F-4E3E-B861-3FAB80541E1D}"/>
-              </a:ext>
-            </a:extLst>
-          </p:cNvPr>
-          <p:cNvSpPr txBox="1"/>
-          <p:nvPr/>
-        </p:nvSpPr>
-        <p:spPr>
-          <a:xfrm>
-            <a:off x="7859949" y="6308179"/>
-            <a:ext cx="2940793" cy="338554"/>
-          </a:xfrm>
-          <a:prstGeom prst="rect">
-            <a:avLst/>
-          </a:prstGeom>
-          <a:solidFill>
-            <a:schemeClr val="accent5">
-              <a:lumMod val="20000"/>
-              <a:lumOff val="80000"/>
-            </a:schemeClr>
-          </a:solidFill>
-          <a:ln>
-            <a:solidFill>
-              <a:schemeClr val="accent5">
-                <a:lumMod val="75000"/>
-              </a:schemeClr>
-            </a:solidFill>
-          </a:ln>
-        </p:spPr>
-        <p:txBody>
-          <a:bodyPr wrap="square" rtlCol="0">
-            <a:spAutoFit/>
-          </a:bodyPr>
-          <a:lstStyle/>
-          <a:p>
-            <a:pPr algn="ctr"/>
-            <a:r>
-              <a:rPr lang="en-GB" sz="1600" b="1" dirty="0"/>
-              <a:t>Pack Date: </a:t>
-            </a:r>
-            <a:r>
-              <a:rPr lang="en-GB" sz="1600" dirty="0"/>
-              <a:t>22 July 2020</a:t>
-            </a:r>
-          </a:p>
-        </p:txBody>
-      </p:sp>
-      <p:sp>
-        <p:nvSpPr>
-          <p:cNvPr id="12" name="TextBox 11">
-            <a:extLst>
-              <a:ext uri="{FF2B5EF4-FFF2-40B4-BE49-F238E27FC236}">
-                <a16:creationId xmlns:a16="http://schemas.microsoft.com/office/drawing/2014/main" id="{C4EE283D-E9D4-406A-8A5D-F434D5E284F8}"/>
-              </a:ext>
-            </a:extLst>
-          </p:cNvPr>
-          <p:cNvSpPr txBox="1"/>
-          <p:nvPr/>
-        </p:nvSpPr>
-        <p:spPr>
-          <a:xfrm>
-            <a:off x="238319" y="1982460"/>
-            <a:ext cx="4736874" cy="461665"/>
-          </a:xfrm>
-          <a:prstGeom prst="rect">
-            <a:avLst/>
-          </a:prstGeom>
-          <a:noFill/>
-        </p:spPr>
-        <p:txBody>
-          <a:bodyPr wrap="none" rtlCol="0">
-            <a:spAutoFit/>
-          </a:bodyPr>
-          <a:lstStyle/>
-          <a:p>
-            <a:r>
-              <a:rPr lang="en-GB" sz="2400" b="1" dirty="0">
-                <a:solidFill>
-                  <a:schemeClr val="accent1"/>
-                </a:solidFill>
-              </a:rPr>
-              <a:t>West Sussex COVID-19 Weekly Data</a:t>
-            </a:r>
-          </a:p>
-        </p:txBody>
-      </p:sp>
-      <p:pic>
-        <p:nvPicPr>
-          <p:cNvPr id="7" name="Picture 6" descr="A picture containing drawing&#10;&#10;Description automatically generated">
-            <a:extLst>
-              <a:ext uri="{FF2B5EF4-FFF2-40B4-BE49-F238E27FC236}">
-                <a16:creationId xmlns:a16="http://schemas.microsoft.com/office/drawing/2014/main" id="{4EDEA5CF-53B2-4E29-8EAA-C0759DBF484F}"/>
-              </a:ext>
-            </a:extLst>
-          </p:cNvPr>
-          <p:cNvPicPr>
-            <a:picLocks noChangeAspect="1"/>
-          </p:cNvPicPr>
-          <p:nvPr/>
-        </p:nvPicPr>
-        <p:blipFill>
-          <a:blip r:embed="rId3">
-            <a:extLst>
-              <a:ext uri="{28A0092B-C50C-407E-A947-70E740481C1C}">
-                <a14:useLocalDpi xmlns:a14="http://schemas.microsoft.com/office/drawing/2010/main" val="0"/>
-              </a:ext>
-            </a:extLst>
-          </a:blip>
-          <a:stretch>
-            <a:fillRect/>
-          </a:stretch>
-        </p:blipFill>
-        <p:spPr>
-          <a:xfrm>
-            <a:off x="362355" y="868180"/>
-            <a:ext cx="1369169" cy="889960"/>
-          </a:xfrm>
-          <a:prstGeom prst="rect">
-            <a:avLst/>
-          </a:prstGeom>
-        </p:spPr>
-      </p:pic>
-    </p:spTree>
-    <p:extLst>
-      <p:ext uri="{BB962C8B-B14F-4D97-AF65-F5344CB8AC3E}">
-        <p14:creationId xmlns:p14="http://schemas.microsoft.com/office/powerpoint/2010/main" val="3395088835"/>
-      </p:ext>
-    </p:extLst>
-  </p:cSld>
-  <p:clrMapOvr>
-    <a:masterClrMapping/>
-  </p:clrMapOvr>
-</p:sld>
-</file>
-
-<file path=ppt/slides/slide2.xml><?xml version="1.0" encoding="utf-8"?>
-<p:sld xmlns:a="http://schemas.openxmlformats.org/drawingml/2006/main" xmlns:r="http://schemas.openxmlformats.org/officeDocument/2006/relationships" xmlns:p="http://schemas.openxmlformats.org/presentationml/2006/main">
-  <p:cSld>
-    <p:spTree>
-      <p:nvGrpSpPr>
-        <p:cNvPr id="1" name=""/>
-        <p:cNvGrpSpPr/>
-        <p:nvPr/>
-      </p:nvGrpSpPr>
-      <p:grpSpPr>
-        <a:xfrm>
-          <a:off x="0" y="0"/>
-          <a:ext cx="0" cy="0"/>
-          <a:chOff x="0" y="0"/>
-          <a:chExt cx="0" cy="0"/>
-        </a:xfrm>
-      </p:grpSpPr>
-      <p:sp>
-        <p:nvSpPr>
-          <p:cNvPr id="5" name="Slide Number Placeholder 4">
-            <a:extLst>
-              <a:ext uri="{FF2B5EF4-FFF2-40B4-BE49-F238E27FC236}">
-                <a16:creationId xmlns:a16="http://schemas.microsoft.com/office/drawing/2014/main" id="{538D49EE-CB69-49C3-876C-D33F27172436}"/>
-              </a:ext>
-            </a:extLst>
-          </p:cNvPr>
-          <p:cNvSpPr>
-            <a:spLocks noGrp="1"/>
-          </p:cNvSpPr>
-          <p:nvPr>
-            <p:ph type="sldNum" sz="quarter" idx="12"/>
-          </p:nvPr>
-        </p:nvSpPr>
-        <p:spPr>
-          <a:xfrm>
-            <a:off x="10852701" y="6490738"/>
-            <a:ext cx="1160672" cy="338554"/>
-          </a:xfrm>
-          <a:solidFill>
-            <a:schemeClr val="accent3">
-              <a:lumMod val="20000"/>
-              <a:lumOff val="80000"/>
-            </a:schemeClr>
-          </a:solidFill>
-        </p:spPr>
-        <p:txBody>
-          <a:bodyPr/>
-          <a:lstStyle/>
-          <a:p>
-            <a:pPr algn="ctr"/>
-            <a:r>
-              <a:rPr lang="en-GB" sz="1600" dirty="0">
-                <a:solidFill>
-                  <a:schemeClr val="tx1"/>
-                </a:solidFill>
-              </a:rPr>
-              <a:t>Slide </a:t>
-            </a:r>
-            <a:fld id="{197E031E-CC7C-4FFD-B59E-418DD80E7695}" type="slidenum">
-              <a:rPr lang="en-GB" sz="1600" smtClean="0">
-                <a:solidFill>
-                  <a:schemeClr val="tx1"/>
-                </a:solidFill>
-              </a:rPr>
-              <a:pPr algn="ctr"/>
-              <a:t>2</a:t>
-            </a:fld>
-            <a:endParaRPr lang="en-GB" sz="1600" dirty="0">
-              <a:solidFill>
-                <a:schemeClr val="tx1"/>
-              </a:solidFill>
-            </a:endParaRPr>
-          </a:p>
-        </p:txBody>
-      </p:sp>
-      <p:grpSp>
-        <p:nvGrpSpPr>
-          <p:cNvPr id="3" name="Group 2">
-            <a:extLst>
-              <a:ext uri="{FF2B5EF4-FFF2-40B4-BE49-F238E27FC236}">
-                <a16:creationId xmlns:a16="http://schemas.microsoft.com/office/drawing/2014/main" id="{4F212B36-F49D-4406-B5BD-422AD5E43E68}"/>
-              </a:ext>
-            </a:extLst>
-          </p:cNvPr>
-          <p:cNvGrpSpPr/>
-          <p:nvPr/>
-        </p:nvGrpSpPr>
-        <p:grpSpPr>
-          <a:xfrm>
-            <a:off x="0" y="0"/>
-            <a:ext cx="12192000" cy="779551"/>
-            <a:chOff x="0" y="0"/>
-            <a:chExt cx="12192000" cy="779551"/>
-          </a:xfrm>
-        </p:grpSpPr>
-        <p:sp>
-          <p:nvSpPr>
-            <p:cNvPr id="2" name="Rectangle 1">
-              <a:extLst>
-                <a:ext uri="{FF2B5EF4-FFF2-40B4-BE49-F238E27FC236}">
-                  <a16:creationId xmlns:a16="http://schemas.microsoft.com/office/drawing/2014/main" id="{75A659C1-0BA4-4D1D-BCD4-AFACAA1155DE}"/>
-                </a:ext>
-              </a:extLst>
-            </p:cNvPr>
-            <p:cNvSpPr/>
-            <p:nvPr/>
-          </p:nvSpPr>
-          <p:spPr>
-            <a:xfrm>
-              <a:off x="0" y="0"/>
-              <a:ext cx="12192000" cy="642026"/>
-            </a:xfrm>
-            <a:prstGeom prst="rect">
-              <a:avLst/>
-            </a:prstGeom>
-            <a:solidFill>
-              <a:schemeClr val="accent5">
-                <a:lumMod val="40000"/>
-                <a:lumOff val="60000"/>
-              </a:schemeClr>
-            </a:solidFill>
-          </p:spPr>
-          <p:style>
-            <a:lnRef idx="2">
-              <a:schemeClr val="accent1">
-                <a:shade val="50000"/>
-              </a:schemeClr>
-            </a:lnRef>
-            <a:fillRef idx="1">
-              <a:schemeClr val="accent1"/>
-            </a:fillRef>
-            <a:effectRef idx="0">
-              <a:schemeClr val="accent1"/>
-            </a:effectRef>
-            <a:fontRef idx="minor">
-              <a:schemeClr val="lt1"/>
-            </a:fontRef>
-          </p:style>
-          <p:txBody>
-            <a:bodyPr rtlCol="0" anchor="ctr"/>
-            <a:lstStyle/>
-            <a:p>
-              <a:pPr algn="ctr"/>
-              <a:endParaRPr lang="en-GB">
-                <a:solidFill>
-                  <a:schemeClr val="accent5">
-                    <a:lumMod val="60000"/>
-                    <a:lumOff val="40000"/>
-                  </a:schemeClr>
-                </a:solidFill>
-              </a:endParaRPr>
-            </a:p>
-          </p:txBody>
-        </p:sp>
-        <p:sp>
-          <p:nvSpPr>
-            <p:cNvPr id="8" name="TextBox 7">
-              <a:extLst>
-                <a:ext uri="{FF2B5EF4-FFF2-40B4-BE49-F238E27FC236}">
-                  <a16:creationId xmlns:a16="http://schemas.microsoft.com/office/drawing/2014/main" id="{F5B87A57-EBFB-46A3-A2DB-3881BCBA7BAB}"/>
-                </a:ext>
-              </a:extLst>
-            </p:cNvPr>
-            <p:cNvSpPr txBox="1"/>
-            <p:nvPr/>
-          </p:nvSpPr>
-          <p:spPr>
-            <a:xfrm>
-              <a:off x="190500" y="133220"/>
+              <a:off x="190500" y="81690"/>
               <a:ext cx="8366906" cy="646331"/>
             </a:xfrm>
             <a:prstGeom prst="rect">
@@ -5224,7 +5680,7 @@
         </p:nvSpPr>
         <p:spPr>
           <a:xfrm>
-            <a:off x="8300721" y="133220"/>
+            <a:off x="8300721" y="57020"/>
             <a:ext cx="3700780" cy="369332"/>
           </a:xfrm>
           <a:prstGeom prst="rect">
@@ -6244,6 +6700,15 @@
 </file>
 
 <file path=customXml/item2.xml><?xml version="1.0" encoding="utf-8"?>
+<?mso-contentType ?>
+<FormTemplates xmlns="http://schemas.microsoft.com/sharepoint/v3/contenttype/forms">
+  <Display>DocumentLibraryForm</Display>
+  <Edit>DocumentLibraryForm</Edit>
+  <New>DocumentLibraryForm</New>
+</FormTemplates>
+</file>
+
+<file path=customXml/item3.xml><?xml version="1.0" encoding="utf-8"?>
 <ct:contentTypeSchema xmlns:ct="http://schemas.microsoft.com/office/2006/metadata/contentType" xmlns:ma="http://schemas.microsoft.com/office/2006/metadata/properties/metaAttributes" ct:_="" ma:_="" ma:contentTypeName="Document" ma:contentTypeID="0x01010003E7173A116BBB4EA178B4442288DCB5" ma:contentTypeVersion="10" ma:contentTypeDescription="Create a new document." ma:contentTypeScope="" ma:versionID="8ab894609abb646d24172300b4fcfdeb">
   <xsd:schema xmlns:xsd="http://www.w3.org/2001/XMLSchema" xmlns:xs="http://www.w3.org/2001/XMLSchema" xmlns:p="http://schemas.microsoft.com/office/2006/metadata/properties" xmlns:ns3="224975ee-2a82-4127-83fc-66d22c2f747a" targetNamespace="http://schemas.microsoft.com/office/2006/metadata/properties" ma:root="true" ma:fieldsID="25b2cf82f3428938808fbc45c05782f3" ns3:_="">
     <xsd:import namespace="224975ee-2a82-4127-83fc-66d22c2f747a"/>
@@ -6427,15 +6892,6 @@
 </ct:contentTypeSchema>
 </file>
 
-<file path=customXml/item3.xml><?xml version="1.0" encoding="utf-8"?>
-<?mso-contentType ?>
-<FormTemplates xmlns="http://schemas.microsoft.com/sharepoint/v3/contenttype/forms">
-  <Display>DocumentLibraryForm</Display>
-  <Edit>DocumentLibraryForm</Edit>
-  <New>DocumentLibraryForm</New>
-</FormTemplates>
-</file>
-
 <file path=customXml/itemProps1.xml><?xml version="1.0" encoding="utf-8"?>
 <ds:datastoreItem xmlns:ds="http://schemas.openxmlformats.org/officeDocument/2006/customXml" ds:itemID="{6DCDAD12-EC44-4C3C-85A7-79536065DF82}">
   <ds:schemaRefs>
@@ -6453,6 +6909,14 @@
 </file>
 
 <file path=customXml/itemProps2.xml><?xml version="1.0" encoding="utf-8"?>
+<ds:datastoreItem xmlns:ds="http://schemas.openxmlformats.org/officeDocument/2006/customXml" ds:itemID="{0D2EA956-31E8-4499-9386-688848203D5D}">
+  <ds:schemaRefs>
+    <ds:schemaRef ds:uri="http://schemas.microsoft.com/sharepoint/v3/contenttype/forms"/>
+  </ds:schemaRefs>
+</ds:datastoreItem>
+</file>
+
+<file path=customXml/itemProps3.xml><?xml version="1.0" encoding="utf-8"?>
 <ds:datastoreItem xmlns:ds="http://schemas.openxmlformats.org/officeDocument/2006/customXml" ds:itemID="{BA9F7DE1-F5C4-4B70-807B-E6A79A83F796}">
   <ds:schemaRefs>
     <ds:schemaRef ds:uri="http://schemas.microsoft.com/office/2006/metadata/contentType"/>
@@ -6468,12 +6932,4 @@
     <ds:schemaRef ds:uri="http://schemas.microsoft.com/internal/obd"/>
   </ds:schemaRefs>
 </ds:datastoreItem>
-</file>
-
-<file path=customXml/itemProps3.xml><?xml version="1.0" encoding="utf-8"?>
-<ds:datastoreItem xmlns:ds="http://schemas.openxmlformats.org/officeDocument/2006/customXml" ds:itemID="{0D2EA956-31E8-4499-9386-688848203D5D}">
-  <ds:schemaRefs>
-    <ds:schemaRef ds:uri="http://schemas.microsoft.com/sharepoint/v3/contenttype/forms"/>
-  </ds:schemaRefs>
-</ds:datastoreItem>
 </file>
</xml_diff>